<commit_message>
end of day 4
</commit_message>
<xml_diff>
--- a/Slides/cts_python_practitioner_day3_v1_2019.pptx
+++ b/Slides/cts_python_practitioner_day3_v1_2019.pptx
@@ -11935,7 +11935,7 @@
           <a:p>
             <a:fld id="{F9ACA898-F605-4900-878E-E9768DF1D293}" type="datetimeFigureOut">
               <a:rPr lang="en-US" smtClean="0"/>
-              <a:t>1/24/20</a:t>
+              <a:t>5/11/20</a:t>
             </a:fld>
             <a:endParaRPr lang="en-US"/>
           </a:p>
@@ -19526,7 +19526,7 @@
           <a:graphicData uri="http://schemas.openxmlformats.org/presentationml/2006/ole">
             <mc:AlternateContent xmlns:mc="http://schemas.openxmlformats.org/markup-compatibility/2006">
               <mc:Choice xmlns:v="urn:schemas-microsoft-com:vml" Requires="v">
-                <p:oleObj spid="_x0000_s2100" name="Packager Shell Object" showAsIcon="1" r:id="rId9" imgW="838800" imgH="437760" progId="Package">
+                <p:oleObj spid="_x0000_s2101" name="Packager Shell Object" showAsIcon="1" r:id="rId9" imgW="838800" imgH="437760" progId="Package">
                   <p:embed/>
                 </p:oleObj>
               </mc:Choice>
@@ -19980,11 +19980,23 @@
                   <a:srgbClr val="00B0F0"/>
                 </a:solidFill>
               </a:rPr>
-              <a:t>basic type of class is an object</a:t>
+              <a:t>basic type of class </a:t>
+            </a:r>
+            <a:r>
+              <a:rPr lang="en-US" sz="1900">
+                <a:solidFill>
+                  <a:srgbClr val="00B0F0"/>
+                </a:solidFill>
+              </a:rPr>
+              <a:t>is Object</a:t>
+            </a:r>
+            <a:r>
+              <a:rPr lang="en-US" sz="1900"/>
+              <a:t>, </a:t>
             </a:r>
             <a:r>
               <a:rPr lang="en-US" sz="1900" dirty="0"/>
-              <a:t>, which generally all other classes inherit as their Parent.</a:t>
+              <a:t>which generally all other classes inherit as their Parent.</a:t>
             </a:r>
           </a:p>
           <a:p>
@@ -20277,7 +20289,7 @@
           <a:graphicData uri="http://schemas.openxmlformats.org/presentationml/2006/ole">
             <mc:AlternateContent xmlns:mc="http://schemas.openxmlformats.org/markup-compatibility/2006">
               <mc:Choice xmlns:v="urn:schemas-microsoft-com:vml" Requires="v">
-                <p:oleObj spid="_x0000_s3124" name="Packager Shell Object" showAsIcon="1" r:id="rId7" imgW="822600" imgH="437760" progId="Package">
+                <p:oleObj spid="_x0000_s3125" name="Packager Shell Object" showAsIcon="1" r:id="rId7" imgW="822600" imgH="437760" progId="Package">
                   <p:embed/>
                 </p:oleObj>
               </mc:Choice>
@@ -21146,7 +21158,7 @@
           <a:graphicData uri="http://schemas.openxmlformats.org/presentationml/2006/ole">
             <mc:AlternateContent xmlns:mc="http://schemas.openxmlformats.org/markup-compatibility/2006">
               <mc:Choice xmlns:v="urn:schemas-microsoft-com:vml" Requires="v">
-                <p:oleObj spid="_x0000_s4130" name="Packager Shell Object" showAsIcon="1" r:id="rId8" imgW="667800" imgH="437760" progId="Package">
+                <p:oleObj spid="_x0000_s4131" name="Packager Shell Object" showAsIcon="1" r:id="rId8" imgW="667800" imgH="437760" progId="Package">
                   <p:embed/>
                 </p:oleObj>
               </mc:Choice>
@@ -21836,7 +21848,7 @@
           <a:graphicData uri="http://schemas.openxmlformats.org/presentationml/2006/ole">
             <mc:AlternateContent xmlns:mc="http://schemas.openxmlformats.org/markup-compatibility/2006">
               <mc:Choice xmlns:v="urn:schemas-microsoft-com:vml" Requires="v">
-                <p:oleObj spid="_x0000_s5148" name="Packager Shell Object" showAsIcon="1" r:id="rId7" imgW="1018080" imgH="437760" progId="Package">
+                <p:oleObj spid="_x0000_s5149" name="Packager Shell Object" showAsIcon="1" r:id="rId7" imgW="1018080" imgH="437760" progId="Package">
                   <p:embed/>
                 </p:oleObj>
               </mc:Choice>

</xml_diff>